<commit_message>
211117 || pjt start
</commit_message>
<xml_diff>
--- a/vue 구조.pptx
+++ b/vue 구조.pptx
@@ -1830,7 +1830,15 @@
           <a:pPr latinLnBrk="1"/>
           <a:r>
             <a:rPr lang="ko-KR" altLang="en-US" dirty="0"/>
-            <a:t>수정 </a:t>
+            <a:t>수정</a:t>
+          </a:r>
+          <a:r>
+            <a:rPr lang="en-US" altLang="ko-KR" dirty="0"/>
+            <a:t>/</a:t>
+          </a:r>
+          <a:r>
+            <a:rPr lang="ko-KR" altLang="en-US" dirty="0"/>
+            <a:t>삭제 </a:t>
           </a:r>
         </a:p>
       </dgm:t>
@@ -1902,6 +1910,85 @@
         </a:p>
       </dgm:t>
     </dgm:pt>
+    <dgm:pt modelId="{D2D236C9-4876-9C4A-A311-E93C38D64622}">
+      <dgm:prSet/>
+      <dgm:spPr/>
+      <dgm:t>
+        <a:bodyPr/>
+        <a:lstStyle/>
+        <a:p>
+          <a:pPr latinLnBrk="1"/>
+          <a:r>
+            <a:rPr lang="en-US" altLang="ko-KR" dirty="0"/>
+            <a:t>carousels</a:t>
+          </a:r>
+          <a:endParaRPr lang="ko-KR" altLang="en-US" dirty="0"/>
+        </a:p>
+      </dgm:t>
+    </dgm:pt>
+    <dgm:pt modelId="{216A4D2E-A26E-C247-9899-2C5923BF4AE0}" type="parTrans" cxnId="{5C88D976-98B9-B642-9E8C-1E807284E3A1}">
+      <dgm:prSet/>
+      <dgm:spPr/>
+      <dgm:t>
+        <a:bodyPr/>
+        <a:lstStyle/>
+        <a:p>
+          <a:pPr latinLnBrk="1"/>
+          <a:endParaRPr lang="ko-KR" altLang="en-US"/>
+        </a:p>
+      </dgm:t>
+    </dgm:pt>
+    <dgm:pt modelId="{21D53E05-2A2E-AE49-8D59-5775A04E43EF}" type="sibTrans" cxnId="{5C88D976-98B9-B642-9E8C-1E807284E3A1}">
+      <dgm:prSet/>
+      <dgm:spPr/>
+      <dgm:t>
+        <a:bodyPr/>
+        <a:lstStyle/>
+        <a:p>
+          <a:pPr latinLnBrk="1"/>
+          <a:endParaRPr lang="ko-KR" altLang="en-US"/>
+        </a:p>
+      </dgm:t>
+    </dgm:pt>
+    <dgm:pt modelId="{A1E08EF2-CF4C-7D4B-995C-D136F73D4A73}">
+      <dgm:prSet/>
+      <dgm:spPr/>
+      <dgm:t>
+        <a:bodyPr/>
+        <a:lstStyle/>
+        <a:p>
+          <a:pPr latinLnBrk="1"/>
+          <a:r>
+            <a:rPr lang="ko-KR" altLang="en-US" dirty="0"/>
+            <a:t>메인</a:t>
+          </a:r>
+        </a:p>
+      </dgm:t>
+    </dgm:pt>
+    <dgm:pt modelId="{CF7BE4D9-8562-9A4B-A3A6-41FF25A201CA}" type="parTrans" cxnId="{A2045D7F-F777-FD4A-8119-4F543D7D4ACA}">
+      <dgm:prSet/>
+      <dgm:spPr/>
+      <dgm:t>
+        <a:bodyPr/>
+        <a:lstStyle/>
+        <a:p>
+          <a:pPr latinLnBrk="1"/>
+          <a:endParaRPr lang="ko-KR" altLang="en-US"/>
+        </a:p>
+      </dgm:t>
+    </dgm:pt>
+    <dgm:pt modelId="{B06421C5-8ED5-B448-9A8D-0C9B25481410}" type="sibTrans" cxnId="{A2045D7F-F777-FD4A-8119-4F543D7D4ACA}">
+      <dgm:prSet/>
+      <dgm:spPr/>
+      <dgm:t>
+        <a:bodyPr/>
+        <a:lstStyle/>
+        <a:p>
+          <a:pPr latinLnBrk="1"/>
+          <a:endParaRPr lang="ko-KR" altLang="en-US"/>
+        </a:p>
+      </dgm:t>
+    </dgm:pt>
     <dgm:pt modelId="{E0306C89-F13B-2148-9957-4283A0F7A9C3}" type="pres">
       <dgm:prSet presAssocID="{96312F99-6EA1-164E-9CB1-141C12734408}" presName="hierChild1" presStyleCnt="0">
         <dgm:presLayoutVars>
@@ -1976,7 +2063,7 @@
       <dgm:spPr/>
     </dgm:pt>
     <dgm:pt modelId="{87A6B375-2C35-E940-BEB6-948E31C7F671}" type="pres">
-      <dgm:prSet presAssocID="{A7611EEE-FBC5-9348-BF09-12AE48C41ADD}" presName="Name37" presStyleLbl="parChTrans1D3" presStyleIdx="0" presStyleCnt="7"/>
+      <dgm:prSet presAssocID="{A7611EEE-FBC5-9348-BF09-12AE48C41ADD}" presName="Name37" presStyleLbl="parChTrans1D3" presStyleIdx="0" presStyleCnt="9"/>
       <dgm:spPr/>
     </dgm:pt>
     <dgm:pt modelId="{E7E032FC-BE59-CB4F-B58B-A42D2EBE47DE}" type="pres">
@@ -1992,7 +2079,7 @@
       <dgm:spPr/>
     </dgm:pt>
     <dgm:pt modelId="{788E45CC-0FDB-FF48-A7E7-70892658096F}" type="pres">
-      <dgm:prSet presAssocID="{66F136C4-3F4F-8B4A-BE16-A61AF0493C4B}" presName="rootText" presStyleLbl="node3" presStyleIdx="0" presStyleCnt="4" custLinFactY="-712638" custLinFactNeighborX="-9721" custLinFactNeighborY="-800000">
+      <dgm:prSet presAssocID="{66F136C4-3F4F-8B4A-BE16-A61AF0493C4B}" presName="rootText" presStyleLbl="node3" presStyleIdx="0" presStyleCnt="6" custLinFactY="-712638" custLinFactNeighborX="-9721" custLinFactNeighborY="-800000">
         <dgm:presLayoutVars>
           <dgm:chPref val="3"/>
         </dgm:presLayoutVars>
@@ -2000,7 +2087,7 @@
       <dgm:spPr/>
     </dgm:pt>
     <dgm:pt modelId="{6AED9915-BB1E-984C-BC0D-FE2EE9609354}" type="pres">
-      <dgm:prSet presAssocID="{66F136C4-3F4F-8B4A-BE16-A61AF0493C4B}" presName="rootConnector" presStyleLbl="node3" presStyleIdx="0" presStyleCnt="4"/>
+      <dgm:prSet presAssocID="{66F136C4-3F4F-8B4A-BE16-A61AF0493C4B}" presName="rootConnector" presStyleLbl="node3" presStyleIdx="0" presStyleCnt="6"/>
       <dgm:spPr/>
     </dgm:pt>
     <dgm:pt modelId="{C6311954-1BAF-A240-851A-D1A40F4EA4E1}" type="pres">
@@ -2012,7 +2099,7 @@
       <dgm:spPr/>
     </dgm:pt>
     <dgm:pt modelId="{99AF5A65-D065-A740-9606-E62126D04779}" type="pres">
-      <dgm:prSet presAssocID="{52059CC2-DA02-7645-B01C-E1705F62EF23}" presName="Name37" presStyleLbl="parChTrans1D3" presStyleIdx="1" presStyleCnt="7"/>
+      <dgm:prSet presAssocID="{52059CC2-DA02-7645-B01C-E1705F62EF23}" presName="Name37" presStyleLbl="parChTrans1D3" presStyleIdx="1" presStyleCnt="9"/>
       <dgm:spPr/>
     </dgm:pt>
     <dgm:pt modelId="{224F85FC-53FF-1E4A-8FC6-C34FF190D161}" type="pres">
@@ -2028,7 +2115,7 @@
       <dgm:spPr/>
     </dgm:pt>
     <dgm:pt modelId="{17B70091-28D7-624E-9AAA-FA65F01CA685}" type="pres">
-      <dgm:prSet presAssocID="{3D2F035A-1F8A-0144-8C98-FA252BC4439D}" presName="rootText" presStyleLbl="node3" presStyleIdx="1" presStyleCnt="4" custLinFactY="-700000" custLinFactNeighborX="10610" custLinFactNeighborY="-798782">
+      <dgm:prSet presAssocID="{3D2F035A-1F8A-0144-8C98-FA252BC4439D}" presName="rootText" presStyleLbl="node3" presStyleIdx="1" presStyleCnt="6" custLinFactY="-700000" custLinFactNeighborX="10610" custLinFactNeighborY="-798782">
         <dgm:presLayoutVars>
           <dgm:chPref val="3"/>
         </dgm:presLayoutVars>
@@ -2036,7 +2123,7 @@
       <dgm:spPr/>
     </dgm:pt>
     <dgm:pt modelId="{CFE1A465-97C5-AF4C-8AC7-AE0D8FB359CD}" type="pres">
-      <dgm:prSet presAssocID="{3D2F035A-1F8A-0144-8C98-FA252BC4439D}" presName="rootConnector" presStyleLbl="node3" presStyleIdx="1" presStyleCnt="4"/>
+      <dgm:prSet presAssocID="{3D2F035A-1F8A-0144-8C98-FA252BC4439D}" presName="rootConnector" presStyleLbl="node3" presStyleIdx="1" presStyleCnt="6"/>
       <dgm:spPr/>
     </dgm:pt>
     <dgm:pt modelId="{1A01828E-3577-8844-BE8B-B972EA93E713}" type="pres">
@@ -2083,6 +2170,42 @@
       <dgm:prSet presAssocID="{3D2F035A-1F8A-0144-8C98-FA252BC4439D}" presName="hierChild5" presStyleCnt="0"/>
       <dgm:spPr/>
     </dgm:pt>
+    <dgm:pt modelId="{D3E15B3A-26BC-D94B-AE4D-14022577FD25}" type="pres">
+      <dgm:prSet presAssocID="{CF7BE4D9-8562-9A4B-A3A6-41FF25A201CA}" presName="Name37" presStyleLbl="parChTrans1D3" presStyleIdx="2" presStyleCnt="9"/>
+      <dgm:spPr/>
+    </dgm:pt>
+    <dgm:pt modelId="{9B4B9423-6A84-8647-BD2F-0A2F2212AA96}" type="pres">
+      <dgm:prSet presAssocID="{A1E08EF2-CF4C-7D4B-995C-D136F73D4A73}" presName="hierRoot2" presStyleCnt="0">
+        <dgm:presLayoutVars>
+          <dgm:hierBranch val="init"/>
+        </dgm:presLayoutVars>
+      </dgm:prSet>
+      <dgm:spPr/>
+    </dgm:pt>
+    <dgm:pt modelId="{08BADB75-B225-2343-B550-5931627F644B}" type="pres">
+      <dgm:prSet presAssocID="{A1E08EF2-CF4C-7D4B-995C-D136F73D4A73}" presName="rootComposite" presStyleCnt="0"/>
+      <dgm:spPr/>
+    </dgm:pt>
+    <dgm:pt modelId="{E27EC8B7-3D63-2D4E-9A4A-6CE9E22D2678}" type="pres">
+      <dgm:prSet presAssocID="{A1E08EF2-CF4C-7D4B-995C-D136F73D4A73}" presName="rootText" presStyleLbl="node3" presStyleIdx="2" presStyleCnt="6" custLinFactY="-700000" custLinFactNeighborX="11742" custLinFactNeighborY="-793441">
+        <dgm:presLayoutVars>
+          <dgm:chPref val="3"/>
+        </dgm:presLayoutVars>
+      </dgm:prSet>
+      <dgm:spPr/>
+    </dgm:pt>
+    <dgm:pt modelId="{E9F969B2-3761-DD4C-8730-1DBC295E9D66}" type="pres">
+      <dgm:prSet presAssocID="{A1E08EF2-CF4C-7D4B-995C-D136F73D4A73}" presName="rootConnector" presStyleLbl="node3" presStyleIdx="2" presStyleCnt="6"/>
+      <dgm:spPr/>
+    </dgm:pt>
+    <dgm:pt modelId="{CB41E100-AD28-DB42-B308-502B579843F4}" type="pres">
+      <dgm:prSet presAssocID="{A1E08EF2-CF4C-7D4B-995C-D136F73D4A73}" presName="hierChild4" presStyleCnt="0"/>
+      <dgm:spPr/>
+    </dgm:pt>
+    <dgm:pt modelId="{85278347-6CCD-DE47-A50D-52EF59A90E75}" type="pres">
+      <dgm:prSet presAssocID="{A1E08EF2-CF4C-7D4B-995C-D136F73D4A73}" presName="hierChild5" presStyleCnt="0"/>
+      <dgm:spPr/>
+    </dgm:pt>
     <dgm:pt modelId="{510F5871-BEBF-3048-82A8-42F6C99DFBAD}" type="pres">
       <dgm:prSet presAssocID="{25D0BC2E-CD3B-D642-88E1-F06DB44AC195}" presName="hierChild5" presStyleCnt="0"/>
       <dgm:spPr/>
@@ -2123,6 +2246,42 @@
       <dgm:prSet presAssocID="{BAFA6ADA-E1A6-1E45-897B-CED88B4355B8}" presName="hierChild6" presStyleCnt="0"/>
       <dgm:spPr/>
     </dgm:pt>
+    <dgm:pt modelId="{C6FEEE7B-C0F9-1144-94AB-A27761E055BA}" type="pres">
+      <dgm:prSet presAssocID="{216A4D2E-A26E-C247-9899-2C5923BF4AE0}" presName="Name37" presStyleLbl="parChTrans1D3" presStyleIdx="3" presStyleCnt="9"/>
+      <dgm:spPr/>
+    </dgm:pt>
+    <dgm:pt modelId="{482E2EF9-C479-D74C-A845-0EC4A632CE85}" type="pres">
+      <dgm:prSet presAssocID="{D2D236C9-4876-9C4A-A311-E93C38D64622}" presName="hierRoot2" presStyleCnt="0">
+        <dgm:presLayoutVars>
+          <dgm:hierBranch val="init"/>
+        </dgm:presLayoutVars>
+      </dgm:prSet>
+      <dgm:spPr/>
+    </dgm:pt>
+    <dgm:pt modelId="{507A30AA-9FCB-B049-B3B6-7FB66CF0C3BA}" type="pres">
+      <dgm:prSet presAssocID="{D2D236C9-4876-9C4A-A311-E93C38D64622}" presName="rootComposite" presStyleCnt="0"/>
+      <dgm:spPr/>
+    </dgm:pt>
+    <dgm:pt modelId="{987B2040-E990-6947-9A8A-0B5E70FDDC6E}" type="pres">
+      <dgm:prSet presAssocID="{D2D236C9-4876-9C4A-A311-E93C38D64622}" presName="rootText" presStyleLbl="node3" presStyleIdx="3" presStyleCnt="6" custLinFactNeighborX="5789" custLinFactNeighborY="60200">
+        <dgm:presLayoutVars>
+          <dgm:chPref val="3"/>
+        </dgm:presLayoutVars>
+      </dgm:prSet>
+      <dgm:spPr/>
+    </dgm:pt>
+    <dgm:pt modelId="{3E29873B-F00D-F947-94BE-EE9E1B1AF162}" type="pres">
+      <dgm:prSet presAssocID="{D2D236C9-4876-9C4A-A311-E93C38D64622}" presName="rootConnector" presStyleLbl="node3" presStyleIdx="3" presStyleCnt="6"/>
+      <dgm:spPr/>
+    </dgm:pt>
+    <dgm:pt modelId="{F5DFF12B-D82A-1E4C-8A83-E6E28B9F7F4C}" type="pres">
+      <dgm:prSet presAssocID="{D2D236C9-4876-9C4A-A311-E93C38D64622}" presName="hierChild4" presStyleCnt="0"/>
+      <dgm:spPr/>
+    </dgm:pt>
+    <dgm:pt modelId="{0942D550-0545-8246-ADEA-CB4D9578B5B0}" type="pres">
+      <dgm:prSet presAssocID="{D2D236C9-4876-9C4A-A311-E93C38D64622}" presName="hierChild5" presStyleCnt="0"/>
+      <dgm:spPr/>
+    </dgm:pt>
     <dgm:pt modelId="{DB7A106B-4FDA-EE4F-B37C-E300115459DE}" type="pres">
       <dgm:prSet presAssocID="{BAFA6ADA-E1A6-1E45-897B-CED88B4355B8}" presName="hierChild7" presStyleCnt="0"/>
       <dgm:spPr/>
@@ -2164,7 +2323,7 @@
       <dgm:spPr/>
     </dgm:pt>
     <dgm:pt modelId="{C2584293-80C9-8940-842C-AB8B8815AF66}" type="pres">
-      <dgm:prSet presAssocID="{219BFECD-3308-3E49-9C6B-4BCD69B00930}" presName="Name111" presStyleLbl="parChTrans1D3" presStyleIdx="2" presStyleCnt="7"/>
+      <dgm:prSet presAssocID="{219BFECD-3308-3E49-9C6B-4BCD69B00930}" presName="Name111" presStyleLbl="parChTrans1D3" presStyleIdx="4" presStyleCnt="9"/>
       <dgm:spPr/>
     </dgm:pt>
     <dgm:pt modelId="{91E80899-04C2-8F4B-AFCB-F208F5D78529}" type="pres">
@@ -2200,7 +2359,7 @@
       <dgm:spPr/>
     </dgm:pt>
     <dgm:pt modelId="{EFF268CA-BCBD-CC4C-A7AB-EEA314EE10A9}" type="pres">
-      <dgm:prSet presAssocID="{F8CE771F-CF37-0649-8575-6D6B8C4A5392}" presName="Name111" presStyleLbl="parChTrans1D3" presStyleIdx="3" presStyleCnt="7"/>
+      <dgm:prSet presAssocID="{F8CE771F-CF37-0649-8575-6D6B8C4A5392}" presName="Name111" presStyleLbl="parChTrans1D3" presStyleIdx="5" presStyleCnt="9"/>
       <dgm:spPr/>
     </dgm:pt>
     <dgm:pt modelId="{2AFD5AC8-F2B5-D34F-8BE9-11EB90224FE2}" type="pres">
@@ -2324,7 +2483,7 @@
       <dgm:spPr/>
     </dgm:pt>
     <dgm:pt modelId="{6FCA1267-7AD9-A14A-9EDC-01898FDB4C7C}" type="pres">
-      <dgm:prSet presAssocID="{459FFB30-1215-174B-8B5A-568658DDC1D9}" presName="rootText3" presStyleLbl="asst1" presStyleIdx="4" presStyleCnt="12" custLinFactNeighborY="28419">
+      <dgm:prSet presAssocID="{459FFB30-1215-174B-8B5A-568658DDC1D9}" presName="rootText3" presStyleLbl="asst1" presStyleIdx="4" presStyleCnt="12" custLinFactNeighborX="1158" custLinFactNeighborY="35365">
         <dgm:presLayoutVars>
           <dgm:chPref val="3"/>
         </dgm:presLayoutVars>
@@ -2524,7 +2683,7 @@
       <dgm:spPr/>
     </dgm:pt>
     <dgm:pt modelId="{45BE6A5E-B59E-F146-B387-DE3E9A9F728E}" type="pres">
-      <dgm:prSet presAssocID="{21D1A7FC-4A7A-1D45-87B7-8FD9C1685950}" presName="Name111" presStyleLbl="parChTrans1D3" presStyleIdx="4" presStyleCnt="7"/>
+      <dgm:prSet presAssocID="{21D1A7FC-4A7A-1D45-87B7-8FD9C1685950}" presName="Name111" presStyleLbl="parChTrans1D3" presStyleIdx="6" presStyleCnt="9"/>
       <dgm:spPr/>
     </dgm:pt>
     <dgm:pt modelId="{8602B32A-3A4C-714C-8593-8E4C93A78B20}" type="pres">
@@ -2628,7 +2787,7 @@
       <dgm:spPr/>
     </dgm:pt>
     <dgm:pt modelId="{475E86B9-FEFF-7D45-8442-9011584D346C}" type="pres">
-      <dgm:prSet presAssocID="{FD999363-6B58-B043-9CFE-F6B6A696CA05}" presName="Name37" presStyleLbl="parChTrans1D3" presStyleIdx="5" presStyleCnt="7"/>
+      <dgm:prSet presAssocID="{FD999363-6B58-B043-9CFE-F6B6A696CA05}" presName="Name37" presStyleLbl="parChTrans1D3" presStyleIdx="7" presStyleCnt="9"/>
       <dgm:spPr/>
     </dgm:pt>
     <dgm:pt modelId="{FE8E0D75-DF60-3C44-B0E9-D05197AFEC8B}" type="pres">
@@ -2644,7 +2803,7 @@
       <dgm:spPr/>
     </dgm:pt>
     <dgm:pt modelId="{F4E3DA8E-06BD-654D-AA6B-A8897E0CF0EC}" type="pres">
-      <dgm:prSet presAssocID="{FB419727-96C4-C744-83A7-DDBA87880FCB}" presName="rootText" presStyleLbl="node3" presStyleIdx="2" presStyleCnt="4" custLinFactX="-100000" custLinFactY="-700000" custLinFactNeighborX="-163738" custLinFactNeighborY="-716864">
+      <dgm:prSet presAssocID="{FB419727-96C4-C744-83A7-DDBA87880FCB}" presName="rootText" presStyleLbl="node3" presStyleIdx="4" presStyleCnt="6" custLinFactX="-100000" custLinFactY="-700000" custLinFactNeighborX="-143248" custLinFactNeighborY="-721495">
         <dgm:presLayoutVars>
           <dgm:chPref val="3"/>
         </dgm:presLayoutVars>
@@ -2652,7 +2811,7 @@
       <dgm:spPr/>
     </dgm:pt>
     <dgm:pt modelId="{B64AA150-26B4-A74A-B106-B3018416B197}" type="pres">
-      <dgm:prSet presAssocID="{FB419727-96C4-C744-83A7-DDBA87880FCB}" presName="rootConnector" presStyleLbl="node3" presStyleIdx="2" presStyleCnt="4"/>
+      <dgm:prSet presAssocID="{FB419727-96C4-C744-83A7-DDBA87880FCB}" presName="rootConnector" presStyleLbl="node3" presStyleIdx="4" presStyleCnt="6"/>
       <dgm:spPr/>
     </dgm:pt>
     <dgm:pt modelId="{8047FD3B-4549-F240-8690-CE3423B9AF55}" type="pres">
@@ -2700,7 +2859,7 @@
       <dgm:spPr/>
     </dgm:pt>
     <dgm:pt modelId="{6DBDE273-D1E7-3249-A4D3-41AE98E0507C}" type="pres">
-      <dgm:prSet presAssocID="{B8348CFC-72DF-D040-B0F8-717E4A624058}" presName="Name37" presStyleLbl="parChTrans1D3" presStyleIdx="6" presStyleCnt="7"/>
+      <dgm:prSet presAssocID="{B8348CFC-72DF-D040-B0F8-717E4A624058}" presName="Name37" presStyleLbl="parChTrans1D3" presStyleIdx="8" presStyleCnt="9"/>
       <dgm:spPr/>
     </dgm:pt>
     <dgm:pt modelId="{61A2BFED-20D8-E247-9C9E-A25299FAD540}" type="pres">
@@ -2716,7 +2875,7 @@
       <dgm:spPr/>
     </dgm:pt>
     <dgm:pt modelId="{E0D4FEE0-AA97-4542-9815-A9684E268D38}" type="pres">
-      <dgm:prSet presAssocID="{AD6DDA5D-4857-7546-A123-EEFEF1B73D63}" presName="rootText" presStyleLbl="node3" presStyleIdx="3" presStyleCnt="4" custLinFactX="-100000" custLinFactY="-700000" custLinFactNeighborX="-163738" custLinFactNeighborY="-716864">
+      <dgm:prSet presAssocID="{AD6DDA5D-4857-7546-A123-EEFEF1B73D63}" presName="rootText" presStyleLbl="node3" presStyleIdx="5" presStyleCnt="6" custLinFactX="-100000" custLinFactY="-700000" custLinFactNeighborX="-133546" custLinFactNeighborY="-718254">
         <dgm:presLayoutVars>
           <dgm:chPref val="3"/>
         </dgm:presLayoutVars>
@@ -2724,7 +2883,7 @@
       <dgm:spPr/>
     </dgm:pt>
     <dgm:pt modelId="{9BC31B52-92D7-3742-A337-C7ED57731FFC}" type="pres">
-      <dgm:prSet presAssocID="{AD6DDA5D-4857-7546-A123-EEFEF1B73D63}" presName="rootConnector" presStyleLbl="node3" presStyleIdx="3" presStyleCnt="4"/>
+      <dgm:prSet presAssocID="{AD6DDA5D-4857-7546-A123-EEFEF1B73D63}" presName="rootConnector" presStyleLbl="node3" presStyleIdx="5" presStyleCnt="6"/>
       <dgm:spPr/>
     </dgm:pt>
     <dgm:pt modelId="{844A04A1-5E25-424D-8775-AD3608F15DD6}" type="pres">
@@ -2756,7 +2915,7 @@
       <dgm:spPr/>
     </dgm:pt>
     <dgm:pt modelId="{A1808A5F-6DBA-D248-AADB-7172ECB16DC6}" type="pres">
-      <dgm:prSet presAssocID="{D0777353-8A5F-DA4C-851D-D2E1CC5813D5}" presName="rootText3" presStyleLbl="asst1" presStyleIdx="11" presStyleCnt="12" custLinFactY="-700000" custLinFactNeighborX="93000" custLinFactNeighborY="-796441">
+      <dgm:prSet presAssocID="{D0777353-8A5F-DA4C-851D-D2E1CC5813D5}" presName="rootText3" presStyleLbl="asst1" presStyleIdx="11" presStyleCnt="12" custLinFactY="-700000" custLinFactNeighborX="93000" custLinFactNeighborY="-791810">
         <dgm:presLayoutVars>
           <dgm:chPref val="3"/>
         </dgm:presLayoutVars>
@@ -2786,6 +2945,7 @@
     <dgm:cxn modelId="{4A0FE80E-6E97-4B4E-A974-861F200F1F83}" type="presOf" srcId="{A2E4EA7A-C414-5242-98EB-A895E87E30B9}" destId="{CE65FBD3-686B-3A48-988D-EAABA190B7A2}" srcOrd="0" destOrd="0" presId="urn:microsoft.com/office/officeart/2005/8/layout/orgChart1"/>
     <dgm:cxn modelId="{02C10313-BE63-A44A-B9D2-F9DD28D54821}" srcId="{46226E13-C0E0-AE44-88A9-B1CE56330E29}" destId="{356D4E06-38F5-E248-BC54-96D93B2D069E}" srcOrd="2" destOrd="0" parTransId="{EFC6BF0B-41B0-B440-9848-6ACED3168254}" sibTransId="{385274B6-D662-DE48-9CD4-87CFDDD80D4E}"/>
     <dgm:cxn modelId="{679C1C14-3809-C649-B327-D01E8478E1D4}" type="presOf" srcId="{13890646-7265-6E42-94BC-B611FE89E03C}" destId="{C3D9D02A-D3DD-C241-A54E-8B065FA59968}" srcOrd="0" destOrd="0" presId="urn:microsoft.com/office/officeart/2005/8/layout/orgChart1"/>
+    <dgm:cxn modelId="{39AC9617-AF79-6143-8DD8-8AF36D20EF35}" type="presOf" srcId="{216A4D2E-A26E-C247-9899-2C5923BF4AE0}" destId="{C6FEEE7B-C0F9-1144-94AB-A27761E055BA}" srcOrd="0" destOrd="0" presId="urn:microsoft.com/office/officeart/2005/8/layout/orgChart1"/>
     <dgm:cxn modelId="{D8FAAD17-4936-634E-A70A-3330BEFECE38}" type="presOf" srcId="{84092E48-9B77-A148-A06B-FA34EBAE62AE}" destId="{6C8F8279-DA78-7C48-B1A4-D21F60571AC5}" srcOrd="0" destOrd="0" presId="urn:microsoft.com/office/officeart/2005/8/layout/orgChart1"/>
     <dgm:cxn modelId="{D169F917-7432-D54B-8D08-3EEC76688D2C}" type="presOf" srcId="{2FEEDF31-84DF-9D4B-B779-D212343809E8}" destId="{77D0440C-167F-EC4A-B9A5-5600DDE4A7EC}" srcOrd="0" destOrd="0" presId="urn:microsoft.com/office/officeart/2005/8/layout/orgChart1"/>
     <dgm:cxn modelId="{E458F41B-A516-9B44-9C2A-065A8DA14503}" type="presOf" srcId="{579F8A41-C4C1-7E46-9EBD-4D5F60E3DBD4}" destId="{6CF22DA9-B6D5-524D-B741-21A1F6784B39}" srcOrd="1" destOrd="0" presId="urn:microsoft.com/office/officeart/2005/8/layout/orgChart1"/>
@@ -2805,6 +2965,7 @@
     <dgm:cxn modelId="{9305FE3F-2115-914A-B9FE-3EB7B28A3FAD}" srcId="{2FC576E2-3AD2-1A49-B013-92DB4A6E3D61}" destId="{13890646-7265-6E42-94BC-B611FE89E03C}" srcOrd="0" destOrd="0" parTransId="{219BFECD-3308-3E49-9C6B-4BCD69B00930}" sibTransId="{442DB586-AA34-524A-9BEA-61BCF54165DB}"/>
     <dgm:cxn modelId="{28986744-EF78-4142-8F56-BB0CC0219DF4}" srcId="{FEB68013-1837-9A41-AB6C-9FF3C1E15B61}" destId="{2FEEDF31-84DF-9D4B-B779-D212343809E8}" srcOrd="1" destOrd="0" parTransId="{4F2B413B-6A4A-EA4A-972B-849C75F8DEDA}" sibTransId="{0B1F009E-CE00-6846-9090-DE191FB8BB0D}"/>
     <dgm:cxn modelId="{7E9ADA47-4107-854E-9980-F5F6AFEA0AD1}" type="presOf" srcId="{AB457585-71CF-BB4E-AB7F-BD8C14CB5FF8}" destId="{FF45C0FE-C727-1B4B-9FFD-B77F7572EC78}" srcOrd="0" destOrd="0" presId="urn:microsoft.com/office/officeart/2005/8/layout/orgChart1"/>
+    <dgm:cxn modelId="{84FF8448-E490-0B4B-BD44-F31259E4F112}" type="presOf" srcId="{D2D236C9-4876-9C4A-A311-E93C38D64622}" destId="{3E29873B-F00D-F947-94BE-EE9E1B1AF162}" srcOrd="1" destOrd="0" presId="urn:microsoft.com/office/officeart/2005/8/layout/orgChart1"/>
     <dgm:cxn modelId="{F01AC548-363E-2549-9357-384BC6C0F530}" type="presOf" srcId="{356D4E06-38F5-E248-BC54-96D93B2D069E}" destId="{46A588E6-D0D2-B84A-9812-F7E01702737D}" srcOrd="0" destOrd="0" presId="urn:microsoft.com/office/officeart/2005/8/layout/orgChart1"/>
     <dgm:cxn modelId="{A7A5BD4E-E37B-B248-A757-180E9B9635D8}" srcId="{2FC576E2-3AD2-1A49-B013-92DB4A6E3D61}" destId="{FEB68013-1837-9A41-AB6C-9FF3C1E15B61}" srcOrd="1" destOrd="0" parTransId="{F8CE771F-CF37-0649-8575-6D6B8C4A5392}" sibTransId="{4A23EC3E-244D-E740-B62A-6C40A2CC5807}"/>
     <dgm:cxn modelId="{7A88D453-1955-E545-988E-9A40C04A4496}" type="presOf" srcId="{47DEFDA6-1DE8-0842-BCE9-86D200E7D535}" destId="{7CDF97C9-C43A-CC44-8768-4B33254DF71E}" srcOrd="0" destOrd="0" presId="urn:microsoft.com/office/officeart/2005/8/layout/orgChart1"/>
@@ -2822,12 +2983,15 @@
     <dgm:cxn modelId="{A3131673-9C95-B54D-997A-A5E0A84D5138}" type="presOf" srcId="{D20DA5EE-6540-7249-A6F8-6C1A58EA8068}" destId="{FACE90D2-63C9-5A49-A5EE-4A193E3AB42C}" srcOrd="0" destOrd="0" presId="urn:microsoft.com/office/officeart/2005/8/layout/orgChart1"/>
     <dgm:cxn modelId="{FF616E75-EBCF-DA43-9DE7-FE3ABDAC779E}" type="presOf" srcId="{A7611EEE-FBC5-9348-BF09-12AE48C41ADD}" destId="{87A6B375-2C35-E940-BEB6-948E31C7F671}" srcOrd="0" destOrd="0" presId="urn:microsoft.com/office/officeart/2005/8/layout/orgChart1"/>
     <dgm:cxn modelId="{980DCC76-AFC7-A24C-8D6C-D1F132274A75}" type="presOf" srcId="{AD6DDA5D-4857-7546-A123-EEFEF1B73D63}" destId="{E0D4FEE0-AA97-4542-9815-A9684E268D38}" srcOrd="0" destOrd="0" presId="urn:microsoft.com/office/officeart/2005/8/layout/orgChart1"/>
+    <dgm:cxn modelId="{5C88D976-98B9-B642-9E8C-1E807284E3A1}" srcId="{BAFA6ADA-E1A6-1E45-897B-CED88B4355B8}" destId="{D2D236C9-4876-9C4A-A311-E93C38D64622}" srcOrd="0" destOrd="0" parTransId="{216A4D2E-A26E-C247-9899-2C5923BF4AE0}" sibTransId="{21D53E05-2A2E-AE49-8D59-5775A04E43EF}"/>
     <dgm:cxn modelId="{64184E78-91C8-EF4C-B14E-7A581AAF2B0F}" type="presOf" srcId="{7A55F32D-5BF0-B944-95F2-44B427A8BEDE}" destId="{019C62C8-FEE0-2544-96E2-F9ACBD90C9CA}" srcOrd="1" destOrd="0" presId="urn:microsoft.com/office/officeart/2005/8/layout/orgChart1"/>
     <dgm:cxn modelId="{513FB679-5370-EA4D-A20F-81C924AF33A2}" type="presOf" srcId="{13890646-7265-6E42-94BC-B611FE89E03C}" destId="{3EC638AE-05AA-7E4B-9BC0-5B62B8EAC3A3}" srcOrd="1" destOrd="0" presId="urn:microsoft.com/office/officeart/2005/8/layout/orgChart1"/>
     <dgm:cxn modelId="{5134787A-781D-1B4B-B993-6E1453966A39}" type="presOf" srcId="{4E3EB484-4B56-8244-9D73-6C176113EF51}" destId="{B4960B38-E098-5E47-840F-2A8C62FC53D0}" srcOrd="0" destOrd="0" presId="urn:microsoft.com/office/officeart/2005/8/layout/orgChart1"/>
+    <dgm:cxn modelId="{9ED8187B-0B01-B541-B60C-308E07F85939}" type="presOf" srcId="{A1E08EF2-CF4C-7D4B-995C-D136F73D4A73}" destId="{E27EC8B7-3D63-2D4E-9A4A-6CE9E22D2678}" srcOrd="0" destOrd="0" presId="urn:microsoft.com/office/officeart/2005/8/layout/orgChart1"/>
     <dgm:cxn modelId="{A1BAC37D-CF9B-334E-AC9E-5CB05FEA2FAC}" srcId="{FEB68013-1837-9A41-AB6C-9FF3C1E15B61}" destId="{459FFB30-1215-174B-8B5A-568658DDC1D9}" srcOrd="0" destOrd="0" parTransId="{D20DA5EE-6540-7249-A6F8-6C1A58EA8068}" sibTransId="{D47C791D-AA4B-FA4F-AEF0-95321C8380E2}"/>
     <dgm:cxn modelId="{0CCD3D7E-1001-254D-B5B8-777E9AD054FF}" type="presOf" srcId="{D36904AE-67DB-E54C-BCA1-DE29BDA742FD}" destId="{172CD475-7454-5849-9AEC-21B1B97E2E91}" srcOrd="0" destOrd="0" presId="urn:microsoft.com/office/officeart/2005/8/layout/orgChart1"/>
     <dgm:cxn modelId="{C4652B7F-DA28-7E47-AEE3-63FE026BDC43}" type="presOf" srcId="{3D2F035A-1F8A-0144-8C98-FA252BC4439D}" destId="{CFE1A465-97C5-AF4C-8AC7-AE0D8FB359CD}" srcOrd="1" destOrd="0" presId="urn:microsoft.com/office/officeart/2005/8/layout/orgChart1"/>
+    <dgm:cxn modelId="{A2045D7F-F777-FD4A-8119-4F543D7D4ACA}" srcId="{25D0BC2E-CD3B-D642-88E1-F06DB44AC195}" destId="{A1E08EF2-CF4C-7D4B-995C-D136F73D4A73}" srcOrd="2" destOrd="0" parTransId="{CF7BE4D9-8562-9A4B-A3A6-41FF25A201CA}" sibTransId="{B06421C5-8ED5-B448-9A8D-0C9B25481410}"/>
     <dgm:cxn modelId="{DC445180-8033-1D44-BFCD-08F61B3D391C}" type="presOf" srcId="{FEB68013-1837-9A41-AB6C-9FF3C1E15B61}" destId="{0AE6868B-D0A3-4B47-92B9-0BF8D6313F8A}" srcOrd="0" destOrd="0" presId="urn:microsoft.com/office/officeart/2005/8/layout/orgChart1"/>
     <dgm:cxn modelId="{E7518683-5293-7C43-AA27-D5893A5B4DE8}" type="presOf" srcId="{46226E13-C0E0-AE44-88A9-B1CE56330E29}" destId="{E09FE675-3B58-A14D-ABCF-6AE2E2C45383}" srcOrd="1" destOrd="0" presId="urn:microsoft.com/office/officeart/2005/8/layout/orgChart1"/>
     <dgm:cxn modelId="{DAC8AE87-281C-864B-AA84-570ABD2569F6}" type="presOf" srcId="{BAFA6ADA-E1A6-1E45-897B-CED88B4355B8}" destId="{80B281E0-A4C9-DA4E-9013-0F25A5722BDD}" srcOrd="1" destOrd="0" presId="urn:microsoft.com/office/officeart/2005/8/layout/orgChart1"/>
@@ -2845,6 +3009,7 @@
     <dgm:cxn modelId="{857E68AD-B5BD-FC4A-BD17-7B6CFED30BAC}" type="presOf" srcId="{AB457585-71CF-BB4E-AB7F-BD8C14CB5FF8}" destId="{3113B385-26EE-3C4B-9800-404B4C712999}" srcOrd="1" destOrd="0" presId="urn:microsoft.com/office/officeart/2005/8/layout/orgChart1"/>
     <dgm:cxn modelId="{D51BC7B0-F56F-0542-A64B-9C26D3B900F8}" srcId="{46226E13-C0E0-AE44-88A9-B1CE56330E29}" destId="{2FC576E2-3AD2-1A49-B013-92DB4A6E3D61}" srcOrd="1" destOrd="0" parTransId="{069E9A20-5259-3B42-99BE-FF4229D6FBAD}" sibTransId="{28F67518-C7D0-8947-AA68-155B340737DD}"/>
     <dgm:cxn modelId="{8FBF86B4-B711-F34F-8669-D0350066C009}" type="presOf" srcId="{FB419727-96C4-C744-83A7-DDBA87880FCB}" destId="{B64AA150-26B4-A74A-B106-B3018416B197}" srcOrd="1" destOrd="0" presId="urn:microsoft.com/office/officeart/2005/8/layout/orgChart1"/>
+    <dgm:cxn modelId="{7EDABCB4-FAB4-9E49-974F-02535D2B3495}" type="presOf" srcId="{A1E08EF2-CF4C-7D4B-995C-D136F73D4A73}" destId="{E9F969B2-3761-DD4C-8730-1DBC295E9D66}" srcOrd="1" destOrd="0" presId="urn:microsoft.com/office/officeart/2005/8/layout/orgChart1"/>
     <dgm:cxn modelId="{ED3B42B5-54DC-CA43-A584-ED26AF567B5C}" srcId="{47DEFDA6-1DE8-0842-BCE9-86D200E7D535}" destId="{7A55F32D-5BF0-B944-95F2-44B427A8BEDE}" srcOrd="0" destOrd="0" parTransId="{EB15BA62-720A-1441-9059-9C09EACCD58F}" sibTransId="{9F69BC87-718C-8D4C-AA04-265AA54C0D8F}"/>
     <dgm:cxn modelId="{D868F9B5-FF9E-B149-A6C5-7E29D765D4CE}" type="presOf" srcId="{EFC6BF0B-41B0-B440-9848-6ACED3168254}" destId="{4AF92E30-C203-E94C-A3C6-31F02B425D05}" srcOrd="0" destOrd="0" presId="urn:microsoft.com/office/officeart/2005/8/layout/orgChart1"/>
     <dgm:cxn modelId="{C31221B7-25D1-9949-8D9D-6A21B2C665E8}" type="presOf" srcId="{069E9A20-5259-3B42-99BE-FF4229D6FBAD}" destId="{3D1CE6F5-6271-804C-ABF0-70F053800C06}" srcOrd="0" destOrd="0" presId="urn:microsoft.com/office/officeart/2005/8/layout/orgChart1"/>
@@ -2852,6 +3017,7 @@
     <dgm:cxn modelId="{517193BA-C9FF-A247-B12B-04AFDBE24573}" type="presOf" srcId="{25D0BC2E-CD3B-D642-88E1-F06DB44AC195}" destId="{CF00563E-88B6-1A47-B5D3-7239ACBF7E38}" srcOrd="1" destOrd="0" presId="urn:microsoft.com/office/officeart/2005/8/layout/orgChart1"/>
     <dgm:cxn modelId="{227503BD-B1E0-AC44-9067-58CF741CEDB1}" type="presOf" srcId="{9C6FE979-8A2E-E84A-BBFB-FD974FA8FFE3}" destId="{19DD4F37-693C-1843-9E81-AE7EB4FF3549}" srcOrd="0" destOrd="0" presId="urn:microsoft.com/office/officeart/2005/8/layout/orgChart1"/>
     <dgm:cxn modelId="{BF40D3BE-A5C3-574F-82AA-5F77366BBAB9}" type="presOf" srcId="{579F8A41-C4C1-7E46-9EBD-4D5F60E3DBD4}" destId="{5FA08318-D3A6-664D-A1DC-1CD73611F778}" srcOrd="0" destOrd="0" presId="urn:microsoft.com/office/officeart/2005/8/layout/orgChart1"/>
+    <dgm:cxn modelId="{788F85C3-99BB-BA4E-8085-45B5D4C0A3A5}" type="presOf" srcId="{D2D236C9-4876-9C4A-A311-E93C38D64622}" destId="{987B2040-E990-6947-9A8A-0B5E70FDDC6E}" srcOrd="0" destOrd="0" presId="urn:microsoft.com/office/officeart/2005/8/layout/orgChart1"/>
     <dgm:cxn modelId="{A6639BC5-A1F2-DC4D-BF6A-F0B6CD74D5F2}" type="presOf" srcId="{4F2B413B-6A4A-EA4A-972B-849C75F8DEDA}" destId="{1AA6F14D-B3D6-6343-BF3E-D9B9D59AB588}" srcOrd="0" destOrd="0" presId="urn:microsoft.com/office/officeart/2005/8/layout/orgChart1"/>
     <dgm:cxn modelId="{8502DBC5-06E9-D14F-9173-357AC75F93E5}" type="presOf" srcId="{21D1A7FC-4A7A-1D45-87B7-8FD9C1685950}" destId="{45BE6A5E-B59E-F146-B387-DE3E9A9F728E}" srcOrd="0" destOrd="0" presId="urn:microsoft.com/office/officeart/2005/8/layout/orgChart1"/>
     <dgm:cxn modelId="{E91DAFC7-16CC-C147-B395-1BEFB386B617}" type="presOf" srcId="{459FFB30-1215-174B-8B5A-568658DDC1D9}" destId="{6FCA1267-7AD9-A14A-9EDC-01898FDB4C7C}" srcOrd="0" destOrd="0" presId="urn:microsoft.com/office/officeart/2005/8/layout/orgChart1"/>
@@ -2862,6 +3028,7 @@
     <dgm:cxn modelId="{B7C94BCF-E43D-8E48-BD95-DC769F4884BC}" type="presOf" srcId="{8BFAA30F-4199-D649-953F-BBFFB8820464}" destId="{9C7CFD96-D422-0D4D-A0ED-85EBCDEC7F7E}" srcOrd="0" destOrd="0" presId="urn:microsoft.com/office/officeart/2005/8/layout/orgChart1"/>
     <dgm:cxn modelId="{9B000DD1-5734-6546-883A-94C6AF999266}" srcId="{459FFB30-1215-174B-8B5A-568658DDC1D9}" destId="{9C6FE979-8A2E-E84A-BBFB-FD974FA8FFE3}" srcOrd="0" destOrd="0" parTransId="{3795D24D-96E2-AB47-9455-84C1484997BF}" sibTransId="{12F75ED9-5B40-044E-B8C8-C98D06CCE3C6}"/>
     <dgm:cxn modelId="{8B308DD6-ABB1-114C-AF36-0E1699532795}" type="presOf" srcId="{AD6DDA5D-4857-7546-A123-EEFEF1B73D63}" destId="{9BC31B52-92D7-3742-A337-C7ED57731FFC}" srcOrd="1" destOrd="0" presId="urn:microsoft.com/office/officeart/2005/8/layout/orgChart1"/>
+    <dgm:cxn modelId="{09BAA9D9-885D-7C4C-A510-1AF335A81B1F}" type="presOf" srcId="{CF7BE4D9-8562-9A4B-A3A6-41FF25A201CA}" destId="{D3E15B3A-26BC-D94B-AE4D-14022577FD25}" srcOrd="0" destOrd="0" presId="urn:microsoft.com/office/officeart/2005/8/layout/orgChart1"/>
     <dgm:cxn modelId="{00E9E6DD-B7F5-B849-8431-4B86347BE719}" srcId="{A6FB68BE-C026-CA47-AB89-6BE1BC16D31E}" destId="{3694E08C-B670-1746-83ED-EFB101500940}" srcOrd="0" destOrd="0" parTransId="{F605136C-7A29-AD48-AC89-D90EC21B3FC4}" sibTransId="{3A9A312E-41EE-7448-A5AD-1B95EBD6007D}"/>
     <dgm:cxn modelId="{B72857E6-01E4-6446-B925-A01DA80A6797}" type="presOf" srcId="{66F136C4-3F4F-8B4A-BE16-A61AF0493C4B}" destId="{6AED9915-BB1E-984C-BC0D-FE2EE9609354}" srcOrd="1" destOrd="0" presId="urn:microsoft.com/office/officeart/2005/8/layout/orgChart1"/>
     <dgm:cxn modelId="{36E9AAEB-4901-074E-86E1-42117F1DC956}" type="presOf" srcId="{219BFECD-3308-3E49-9C6B-4BCD69B00930}" destId="{C2584293-80C9-8940-842C-AB8B8815AF66}" srcOrd="0" destOrd="0" presId="urn:microsoft.com/office/officeart/2005/8/layout/orgChart1"/>
@@ -2905,6 +3072,13 @@
     <dgm:cxn modelId="{13C39435-5A34-D348-B54D-AD6A89EBD567}" type="presParOf" srcId="{335C28F4-464B-0E40-98B7-B2CF55C9E2E8}" destId="{209900B1-F708-D343-89A7-23A7E772396A}" srcOrd="1" destOrd="0" presId="urn:microsoft.com/office/officeart/2005/8/layout/orgChart1"/>
     <dgm:cxn modelId="{12DB2F6F-083C-B842-861D-3FB5ECA3786E}" type="presParOf" srcId="{335C28F4-464B-0E40-98B7-B2CF55C9E2E8}" destId="{F06AAAB3-BB92-194A-872C-870A7C47846F}" srcOrd="2" destOrd="0" presId="urn:microsoft.com/office/officeart/2005/8/layout/orgChart1"/>
     <dgm:cxn modelId="{8AAA6678-BA2F-4E41-9F16-B2E1DC6E2983}" type="presParOf" srcId="{224F85FC-53FF-1E4A-8FC6-C34FF190D161}" destId="{93A35513-1305-0242-ABC6-6B8C72F1D33A}" srcOrd="2" destOrd="0" presId="urn:microsoft.com/office/officeart/2005/8/layout/orgChart1"/>
+    <dgm:cxn modelId="{3E91C5BA-C94C-0043-8B39-FEAF7B876664}" type="presParOf" srcId="{BF53FD2C-1DC6-E54E-9ABB-1ABD8F420D4E}" destId="{D3E15B3A-26BC-D94B-AE4D-14022577FD25}" srcOrd="4" destOrd="0" presId="urn:microsoft.com/office/officeart/2005/8/layout/orgChart1"/>
+    <dgm:cxn modelId="{8E2F3E13-54C2-E442-A089-5D1B7826AA10}" type="presParOf" srcId="{BF53FD2C-1DC6-E54E-9ABB-1ABD8F420D4E}" destId="{9B4B9423-6A84-8647-BD2F-0A2F2212AA96}" srcOrd="5" destOrd="0" presId="urn:microsoft.com/office/officeart/2005/8/layout/orgChart1"/>
+    <dgm:cxn modelId="{1C135FDF-3C52-5047-9363-4F20478677D7}" type="presParOf" srcId="{9B4B9423-6A84-8647-BD2F-0A2F2212AA96}" destId="{08BADB75-B225-2343-B550-5931627F644B}" srcOrd="0" destOrd="0" presId="urn:microsoft.com/office/officeart/2005/8/layout/orgChart1"/>
+    <dgm:cxn modelId="{C19DD197-E7C9-7C49-BA92-81F95102916C}" type="presParOf" srcId="{08BADB75-B225-2343-B550-5931627F644B}" destId="{E27EC8B7-3D63-2D4E-9A4A-6CE9E22D2678}" srcOrd="0" destOrd="0" presId="urn:microsoft.com/office/officeart/2005/8/layout/orgChart1"/>
+    <dgm:cxn modelId="{F6BBF73B-3E2C-0E43-A259-73DC452FEE4C}" type="presParOf" srcId="{08BADB75-B225-2343-B550-5931627F644B}" destId="{E9F969B2-3761-DD4C-8730-1DBC295E9D66}" srcOrd="1" destOrd="0" presId="urn:microsoft.com/office/officeart/2005/8/layout/orgChart1"/>
+    <dgm:cxn modelId="{F71DDE25-2E09-8445-B5F6-FD314E6B7BC7}" type="presParOf" srcId="{9B4B9423-6A84-8647-BD2F-0A2F2212AA96}" destId="{CB41E100-AD28-DB42-B308-502B579843F4}" srcOrd="1" destOrd="0" presId="urn:microsoft.com/office/officeart/2005/8/layout/orgChart1"/>
+    <dgm:cxn modelId="{EBF53C7F-EC4E-AD4A-9D6C-5DBE47E41F6B}" type="presParOf" srcId="{9B4B9423-6A84-8647-BD2F-0A2F2212AA96}" destId="{85278347-6CCD-DE47-A50D-52EF59A90E75}" srcOrd="2" destOrd="0" presId="urn:microsoft.com/office/officeart/2005/8/layout/orgChart1"/>
     <dgm:cxn modelId="{3C74B704-6508-BA4E-9C77-A7F0B6BD2549}" type="presParOf" srcId="{1332D583-4D97-B747-B453-64F579D8F2CE}" destId="{510F5871-BEBF-3048-82A8-42F6C99DFBAD}" srcOrd="2" destOrd="0" presId="urn:microsoft.com/office/officeart/2005/8/layout/orgChart1"/>
     <dgm:cxn modelId="{E87A0660-BFBD-824C-A7E9-619812966DFF}" type="presParOf" srcId="{D2B1FB6A-6904-BD4B-B80C-8F9FA6433F09}" destId="{06CCBCCD-3FF3-FA47-A6D6-BABCE9AC1524}" srcOrd="2" destOrd="0" presId="urn:microsoft.com/office/officeart/2005/8/layout/orgChart1"/>
     <dgm:cxn modelId="{2AD7E9F3-0040-9C4D-92A5-0D4B542E921A}" type="presParOf" srcId="{06CCBCCD-3FF3-FA47-A6D6-BABCE9AC1524}" destId="{0EDB4197-B52F-E04A-B027-10DD2A012602}" srcOrd="0" destOrd="0" presId="urn:microsoft.com/office/officeart/2005/8/layout/orgChart1"/>
@@ -2913,6 +3087,13 @@
     <dgm:cxn modelId="{C759B5AC-C664-A04C-B27D-6122C5DC04C4}" type="presParOf" srcId="{81DC3382-3A93-5245-8A43-FA4994AF29C1}" destId="{20EC9085-AB29-D442-A684-EA23593B6C2D}" srcOrd="0" destOrd="0" presId="urn:microsoft.com/office/officeart/2005/8/layout/orgChart1"/>
     <dgm:cxn modelId="{D7C52625-95AD-6A49-B23A-497F2218587D}" type="presParOf" srcId="{81DC3382-3A93-5245-8A43-FA4994AF29C1}" destId="{80B281E0-A4C9-DA4E-9013-0F25A5722BDD}" srcOrd="1" destOrd="0" presId="urn:microsoft.com/office/officeart/2005/8/layout/orgChart1"/>
     <dgm:cxn modelId="{79123E1B-DA67-E147-A8B1-0B8F682EAE0D}" type="presParOf" srcId="{5437DECA-4C60-404E-AB11-520A49BA75C8}" destId="{918A5B3A-A292-3E45-8A3A-8F0BC1277C31}" srcOrd="1" destOrd="0" presId="urn:microsoft.com/office/officeart/2005/8/layout/orgChart1"/>
+    <dgm:cxn modelId="{8C4A7845-C922-C44E-8587-8A1B3F9DD752}" type="presParOf" srcId="{918A5B3A-A292-3E45-8A3A-8F0BC1277C31}" destId="{C6FEEE7B-C0F9-1144-94AB-A27761E055BA}" srcOrd="0" destOrd="0" presId="urn:microsoft.com/office/officeart/2005/8/layout/orgChart1"/>
+    <dgm:cxn modelId="{1CEFC315-69A3-164F-973E-BAA918FE2AB5}" type="presParOf" srcId="{918A5B3A-A292-3E45-8A3A-8F0BC1277C31}" destId="{482E2EF9-C479-D74C-A845-0EC4A632CE85}" srcOrd="1" destOrd="0" presId="urn:microsoft.com/office/officeart/2005/8/layout/orgChart1"/>
+    <dgm:cxn modelId="{B9AACD12-CCC5-6741-8360-582180370FA0}" type="presParOf" srcId="{482E2EF9-C479-D74C-A845-0EC4A632CE85}" destId="{507A30AA-9FCB-B049-B3B6-7FB66CF0C3BA}" srcOrd="0" destOrd="0" presId="urn:microsoft.com/office/officeart/2005/8/layout/orgChart1"/>
+    <dgm:cxn modelId="{2E2E90F4-8C74-C344-A280-90A210034847}" type="presParOf" srcId="{507A30AA-9FCB-B049-B3B6-7FB66CF0C3BA}" destId="{987B2040-E990-6947-9A8A-0B5E70FDDC6E}" srcOrd="0" destOrd="0" presId="urn:microsoft.com/office/officeart/2005/8/layout/orgChart1"/>
+    <dgm:cxn modelId="{4A9D10D6-C25F-2946-9506-32739D5E59F6}" type="presParOf" srcId="{507A30AA-9FCB-B049-B3B6-7FB66CF0C3BA}" destId="{3E29873B-F00D-F947-94BE-EE9E1B1AF162}" srcOrd="1" destOrd="0" presId="urn:microsoft.com/office/officeart/2005/8/layout/orgChart1"/>
+    <dgm:cxn modelId="{15217F5B-7EF5-F34B-A5E7-C3512D55CC2D}" type="presParOf" srcId="{482E2EF9-C479-D74C-A845-0EC4A632CE85}" destId="{F5DFF12B-D82A-1E4C-8A83-E6E28B9F7F4C}" srcOrd="1" destOrd="0" presId="urn:microsoft.com/office/officeart/2005/8/layout/orgChart1"/>
+    <dgm:cxn modelId="{1AACDD8A-62C9-E64B-91F3-B87461241B23}" type="presParOf" srcId="{482E2EF9-C479-D74C-A845-0EC4A632CE85}" destId="{0942D550-0545-8246-ADEA-CB4D9578B5B0}" srcOrd="2" destOrd="0" presId="urn:microsoft.com/office/officeart/2005/8/layout/orgChart1"/>
     <dgm:cxn modelId="{EABD216A-0826-3A4B-930F-B6C6DC437A1A}" type="presParOf" srcId="{5437DECA-4C60-404E-AB11-520A49BA75C8}" destId="{DB7A106B-4FDA-EE4F-B37C-E300115459DE}" srcOrd="2" destOrd="0" presId="urn:microsoft.com/office/officeart/2005/8/layout/orgChart1"/>
     <dgm:cxn modelId="{943BFF96-39AF-7A4E-B839-CA4508FB9E14}" type="presParOf" srcId="{06CCBCCD-3FF3-FA47-A6D6-BABCE9AC1524}" destId="{3D1CE6F5-6271-804C-ABF0-70F053800C06}" srcOrd="2" destOrd="0" presId="urn:microsoft.com/office/officeart/2005/8/layout/orgChart1"/>
     <dgm:cxn modelId="{17965468-69E6-E54A-90C7-57772AE82B36}" type="presParOf" srcId="{06CCBCCD-3FF3-FA47-A6D6-BABCE9AC1524}" destId="{3020418F-7479-824C-B279-A825DDE6DAE4}" srcOrd="3" destOrd="0" presId="urn:microsoft.com/office/officeart/2005/8/layout/orgChart1"/>
@@ -3081,10 +3262,10 @@
                 <a:pt x="0" y="45720"/>
               </a:moveTo>
               <a:lnTo>
-                <a:pt x="0" y="100582"/>
+                <a:pt x="0" y="116911"/>
               </a:lnTo>
               <a:lnTo>
-                <a:pt x="729895" y="100582"/>
+                <a:pt x="729895" y="116911"/>
               </a:lnTo>
             </a:path>
           </a:pathLst>
@@ -3126,7 +3307,7 @@
       <dsp:spPr>
         <a:xfrm>
           <a:off x="626029" y="680362"/>
-          <a:ext cx="500701" cy="334771"/>
+          <a:ext cx="713618" cy="329870"/>
         </a:xfrm>
         <a:custGeom>
           <a:avLst/>
@@ -3140,13 +3321,13 @@
                 <a:pt x="0" y="0"/>
               </a:moveTo>
               <a:lnTo>
-                <a:pt x="0" y="260724"/>
+                <a:pt x="0" y="255822"/>
               </a:lnTo>
               <a:lnTo>
-                <a:pt x="500701" y="260724"/>
+                <a:pt x="713618" y="255822"/>
               </a:lnTo>
               <a:lnTo>
-                <a:pt x="500701" y="334771"/>
+                <a:pt x="713618" y="329870"/>
               </a:lnTo>
             </a:path>
           </a:pathLst>
@@ -3187,8 +3368,8 @@
       </dsp:nvSpPr>
       <dsp:spPr>
         <a:xfrm>
-          <a:off x="24801" y="1367740"/>
-          <a:ext cx="91440" cy="324397"/>
+          <a:off x="51399" y="1351410"/>
+          <a:ext cx="91440" cy="340727"/>
         </a:xfrm>
         <a:custGeom>
           <a:avLst/>
@@ -3199,13 +3380,10 @@
           <a:pathLst>
             <a:path>
               <a:moveTo>
-                <a:pt x="45720" y="0"/>
+                <a:pt x="84436" y="0"/>
               </a:moveTo>
               <a:lnTo>
-                <a:pt x="45720" y="324397"/>
-              </a:lnTo>
-              <a:lnTo>
-                <a:pt x="72318" y="324397"/>
+                <a:pt x="45720" y="340727"/>
               </a:lnTo>
             </a:path>
           </a:pathLst>
@@ -3246,8 +3424,8 @@
       </dsp:nvSpPr>
       <dsp:spPr>
         <a:xfrm>
-          <a:off x="352606" y="680362"/>
-          <a:ext cx="273423" cy="334771"/>
+          <a:off x="417921" y="680362"/>
+          <a:ext cx="208108" cy="318442"/>
         </a:xfrm>
         <a:custGeom>
           <a:avLst/>
@@ -3258,16 +3436,16 @@
           <a:pathLst>
             <a:path>
               <a:moveTo>
-                <a:pt x="273423" y="0"/>
+                <a:pt x="208108" y="0"/>
               </a:moveTo>
               <a:lnTo>
-                <a:pt x="273423" y="260724"/>
+                <a:pt x="208108" y="244395"/>
               </a:lnTo>
               <a:lnTo>
-                <a:pt x="0" y="260724"/>
+                <a:pt x="0" y="244395"/>
               </a:lnTo>
               <a:lnTo>
-                <a:pt x="0" y="334771"/>
+                <a:pt x="0" y="318442"/>
               </a:lnTo>
             </a:path>
           </a:pathLst>
@@ -3715,8 +3893,8 @@
       </dsp:nvSpPr>
       <dsp:spPr>
         <a:xfrm>
-          <a:off x="4815585" y="1957590"/>
-          <a:ext cx="304327" cy="314475"/>
+          <a:off x="4815585" y="1982082"/>
+          <a:ext cx="312493" cy="289983"/>
         </a:xfrm>
         <a:custGeom>
           <a:avLst/>
@@ -3727,10 +3905,10 @@
           <a:pathLst>
             <a:path>
               <a:moveTo>
-                <a:pt x="304327" y="0"/>
+                <a:pt x="312493" y="0"/>
               </a:moveTo>
               <a:lnTo>
-                <a:pt x="0" y="314475"/>
+                <a:pt x="0" y="289983"/>
               </a:lnTo>
             </a:path>
           </a:pathLst>
@@ -3771,8 +3949,8 @@
       </dsp:nvSpPr>
       <dsp:spPr>
         <a:xfrm>
-          <a:off x="5472519" y="1330155"/>
-          <a:ext cx="553331" cy="451131"/>
+          <a:off x="5480686" y="1330155"/>
+          <a:ext cx="545164" cy="475623"/>
         </a:xfrm>
         <a:custGeom>
           <a:avLst/>
@@ -3783,13 +3961,13 @@
           <a:pathLst>
             <a:path>
               <a:moveTo>
-                <a:pt x="553331" y="0"/>
+                <a:pt x="545164" y="0"/>
               </a:moveTo>
               <a:lnTo>
-                <a:pt x="553331" y="451131"/>
+                <a:pt x="545164" y="475623"/>
               </a:lnTo>
               <a:lnTo>
-                <a:pt x="0" y="451131"/>
+                <a:pt x="0" y="475623"/>
               </a:lnTo>
             </a:path>
           </a:pathLst>
@@ -4118,6 +4296,65 @@
         <a:fontRef idx="minor"/>
       </dsp:style>
     </dsp:sp>
+    <dsp:sp modelId="{C6FEEE7B-C0F9-1144-94AB-A27761E055BA}">
+      <dsp:nvSpPr>
+        <dsp:cNvPr id="0" name=""/>
+        <dsp:cNvSpPr/>
+      </dsp:nvSpPr>
+      <dsp:spPr>
+        <a:xfrm>
+          <a:off x="2172835" y="1030669"/>
+          <a:ext cx="91440" cy="361978"/>
+        </a:xfrm>
+        <a:custGeom>
+          <a:avLst/>
+          <a:gdLst/>
+          <a:ahLst/>
+          <a:cxnLst/>
+          <a:rect l="0" t="0" r="0" b="0"/>
+          <a:pathLst>
+            <a:path>
+              <a:moveTo>
+                <a:pt x="45720" y="0"/>
+              </a:moveTo>
+              <a:lnTo>
+                <a:pt x="45720" y="361978"/>
+              </a:lnTo>
+              <a:lnTo>
+                <a:pt x="107108" y="361978"/>
+              </a:lnTo>
+            </a:path>
+          </a:pathLst>
+        </a:custGeom>
+        <a:noFill/>
+        <a:ln w="12700" cap="flat" cmpd="sng" algn="ctr">
+          <a:solidFill>
+            <a:schemeClr val="dk1">
+              <a:shade val="80000"/>
+              <a:hueOff val="0"/>
+              <a:satOff val="0"/>
+              <a:lumOff val="0"/>
+              <a:alphaOff val="0"/>
+            </a:schemeClr>
+          </a:solidFill>
+          <a:prstDash val="solid"/>
+          <a:miter lim="800000"/>
+        </a:ln>
+        <a:effectLst/>
+      </dsp:spPr>
+      <dsp:style>
+        <a:lnRef idx="2">
+          <a:scrgbClr r="0" g="0" b="0"/>
+        </a:lnRef>
+        <a:fillRef idx="0">
+          <a:scrgbClr r="0" g="0" b="0"/>
+        </a:fillRef>
+        <a:effectRef idx="0">
+          <a:scrgbClr r="0" g="0" b="0"/>
+        </a:effectRef>
+        <a:fontRef idx="minor"/>
+      </dsp:style>
+    </dsp:sp>
     <dsp:sp modelId="{0EDB4197-B52F-E04A-B027-10DD2A012602}">
       <dsp:nvSpPr>
         <dsp:cNvPr id="0" name=""/>
@@ -4177,6 +4414,68 @@
         <a:fontRef idx="minor"/>
       </dsp:style>
     </dsp:sp>
+    <dsp:sp modelId="{D3E15B3A-26BC-D94B-AE4D-14022577FD25}">
+      <dsp:nvSpPr>
+        <dsp:cNvPr id="0" name=""/>
+        <dsp:cNvSpPr/>
+      </dsp:nvSpPr>
+      <dsp:spPr>
+        <a:xfrm>
+          <a:off x="3695446" y="1875179"/>
+          <a:ext cx="653964" cy="372042"/>
+        </a:xfrm>
+        <a:custGeom>
+          <a:avLst/>
+          <a:gdLst/>
+          <a:ahLst/>
+          <a:cxnLst/>
+          <a:rect l="0" t="0" r="0" b="0"/>
+          <a:pathLst>
+            <a:path>
+              <a:moveTo>
+                <a:pt x="0" y="0"/>
+              </a:moveTo>
+              <a:lnTo>
+                <a:pt x="0" y="297994"/>
+              </a:lnTo>
+              <a:lnTo>
+                <a:pt x="653964" y="297994"/>
+              </a:lnTo>
+              <a:lnTo>
+                <a:pt x="653964" y="372042"/>
+              </a:lnTo>
+            </a:path>
+          </a:pathLst>
+        </a:custGeom>
+        <a:noFill/>
+        <a:ln w="12700" cap="flat" cmpd="sng" algn="ctr">
+          <a:solidFill>
+            <a:schemeClr val="dk1">
+              <a:shade val="80000"/>
+              <a:hueOff val="0"/>
+              <a:satOff val="0"/>
+              <a:lumOff val="0"/>
+              <a:alphaOff val="0"/>
+            </a:schemeClr>
+          </a:solidFill>
+          <a:prstDash val="solid"/>
+          <a:miter lim="800000"/>
+        </a:ln>
+        <a:effectLst/>
+      </dsp:spPr>
+      <dsp:style>
+        <a:lnRef idx="2">
+          <a:scrgbClr r="0" g="0" b="0"/>
+        </a:lnRef>
+        <a:fillRef idx="0">
+          <a:scrgbClr r="0" g="0" b="0"/>
+        </a:fillRef>
+        <a:effectRef idx="0">
+          <a:scrgbClr r="0" g="0" b="0"/>
+        </a:effectRef>
+        <a:fontRef idx="minor"/>
+      </dsp:style>
+    </dsp:sp>
     <dsp:sp modelId="{01E5C922-53B1-8A4C-BA4F-09EBDA93916E}">
       <dsp:nvSpPr>
         <dsp:cNvPr id="0" name=""/>
@@ -4184,7 +4483,7 @@
       </dsp:nvSpPr>
       <dsp:spPr>
         <a:xfrm>
-          <a:off x="3516448" y="2580995"/>
+          <a:off x="3089795" y="2580995"/>
           <a:ext cx="91440" cy="324394"/>
         </a:xfrm>
         <a:custGeom>
@@ -4240,8 +4539,8 @@
       </dsp:nvSpPr>
       <dsp:spPr>
         <a:xfrm>
-          <a:off x="3695446" y="1875179"/>
-          <a:ext cx="219328" cy="353209"/>
+          <a:off x="3488121" y="1875179"/>
+          <a:ext cx="207325" cy="353209"/>
         </a:xfrm>
         <a:custGeom>
           <a:avLst/>
@@ -4252,16 +4551,16 @@
           <a:pathLst>
             <a:path>
               <a:moveTo>
-                <a:pt x="0" y="0"/>
+                <a:pt x="207325" y="0"/>
               </a:moveTo>
+              <a:lnTo>
+                <a:pt x="207325" y="279162"/>
+              </a:lnTo>
               <a:lnTo>
                 <a:pt x="0" y="279162"/>
               </a:lnTo>
               <a:lnTo>
-                <a:pt x="219328" y="279162"/>
-              </a:lnTo>
-              <a:lnTo>
-                <a:pt x="219328" y="353209"/>
+                <a:pt x="0" y="353209"/>
               </a:lnTo>
             </a:path>
           </a:pathLst>
@@ -4302,8 +4601,8 @@
       </dsp:nvSpPr>
       <dsp:spPr>
         <a:xfrm>
-          <a:off x="2918090" y="1875179"/>
-          <a:ext cx="777356" cy="304352"/>
+          <a:off x="2491437" y="1875179"/>
+          <a:ext cx="1204009" cy="304352"/>
         </a:xfrm>
         <a:custGeom>
           <a:avLst/>
@@ -4314,10 +4613,10 @@
           <a:pathLst>
             <a:path>
               <a:moveTo>
-                <a:pt x="777356" y="0"/>
+                <a:pt x="1204009" y="0"/>
               </a:moveTo>
               <a:lnTo>
-                <a:pt x="777356" y="230304"/>
+                <a:pt x="1204009" y="230304"/>
               </a:lnTo>
               <a:lnTo>
                 <a:pt x="0" y="230304"/>
@@ -4586,7 +4885,7 @@
       </dsp:nvSpPr>
       <dsp:spPr>
         <a:xfrm>
-          <a:off x="2565484" y="2179531"/>
+          <a:off x="2138830" y="2179531"/>
           <a:ext cx="705212" cy="352606"/>
         </a:xfrm>
         <a:prstGeom prst="rect">
@@ -4654,7 +4953,7 @@
         </a:p>
       </dsp:txBody>
       <dsp:txXfrm>
-        <a:off x="2565484" y="2179531"/>
+        <a:off x="2138830" y="2179531"/>
         <a:ext cx="705212" cy="352606"/>
       </dsp:txXfrm>
     </dsp:sp>
@@ -4665,7 +4964,7 @@
       </dsp:nvSpPr>
       <dsp:spPr>
         <a:xfrm>
-          <a:off x="3562168" y="2228388"/>
+          <a:off x="3135515" y="2228388"/>
           <a:ext cx="705212" cy="352606"/>
         </a:xfrm>
         <a:prstGeom prst="rect">
@@ -4733,7 +5032,7 @@
         </a:p>
       </dsp:txBody>
       <dsp:txXfrm>
-        <a:off x="3562168" y="2228388"/>
+        <a:off x="3135515" y="2228388"/>
         <a:ext cx="705212" cy="352606"/>
       </dsp:txXfrm>
     </dsp:sp>
@@ -4744,7 +5043,7 @@
       </dsp:nvSpPr>
       <dsp:spPr>
         <a:xfrm>
-          <a:off x="3562168" y="2729086"/>
+          <a:off x="3135515" y="2729086"/>
           <a:ext cx="705212" cy="352606"/>
         </a:xfrm>
         <a:prstGeom prst="rect">
@@ -4812,7 +5111,86 @@
         </a:p>
       </dsp:txBody>
       <dsp:txXfrm>
-        <a:off x="3562168" y="2729086"/>
+        <a:off x="3135515" y="2729086"/>
+        <a:ext cx="705212" cy="352606"/>
+      </dsp:txXfrm>
+    </dsp:sp>
+    <dsp:sp modelId="{E27EC8B7-3D63-2D4E-9A4A-6CE9E22D2678}">
+      <dsp:nvSpPr>
+        <dsp:cNvPr id="0" name=""/>
+        <dsp:cNvSpPr/>
+      </dsp:nvSpPr>
+      <dsp:spPr>
+        <a:xfrm>
+          <a:off x="3996805" y="2247221"/>
+          <a:ext cx="705212" cy="352606"/>
+        </a:xfrm>
+        <a:prstGeom prst="rect">
+          <a:avLst/>
+        </a:prstGeom>
+        <a:solidFill>
+          <a:schemeClr val="lt1">
+            <a:hueOff val="0"/>
+            <a:satOff val="0"/>
+            <a:lumOff val="0"/>
+            <a:alphaOff val="0"/>
+          </a:schemeClr>
+        </a:solidFill>
+        <a:ln w="12700" cap="flat" cmpd="sng" algn="ctr">
+          <a:solidFill>
+            <a:schemeClr val="dk1">
+              <a:shade val="80000"/>
+              <a:hueOff val="0"/>
+              <a:satOff val="0"/>
+              <a:lumOff val="0"/>
+              <a:alphaOff val="0"/>
+            </a:schemeClr>
+          </a:solidFill>
+          <a:prstDash val="solid"/>
+          <a:miter lim="800000"/>
+        </a:ln>
+        <a:effectLst/>
+      </dsp:spPr>
+      <dsp:style>
+        <a:lnRef idx="2">
+          <a:scrgbClr r="0" g="0" b="0"/>
+        </a:lnRef>
+        <a:fillRef idx="1">
+          <a:scrgbClr r="0" g="0" b="0"/>
+        </a:fillRef>
+        <a:effectRef idx="0">
+          <a:scrgbClr r="0" g="0" b="0"/>
+        </a:effectRef>
+        <a:fontRef idx="minor">
+          <a:schemeClr val="lt1"/>
+        </a:fontRef>
+      </dsp:style>
+      <dsp:txBody>
+        <a:bodyPr spcFirstLastPara="0" vert="horz" wrap="square" lIns="5080" tIns="5080" rIns="5080" bIns="5080" numCol="1" spcCol="1270" anchor="ctr" anchorCtr="0">
+          <a:noAutofit/>
+        </a:bodyPr>
+        <a:lstStyle/>
+        <a:p>
+          <a:pPr marL="0" lvl="0" indent="0" algn="ctr" defTabSz="355600" latinLnBrk="1">
+            <a:lnSpc>
+              <a:spcPct val="90000"/>
+            </a:lnSpc>
+            <a:spcBef>
+              <a:spcPct val="0"/>
+            </a:spcBef>
+            <a:spcAft>
+              <a:spcPct val="35000"/>
+            </a:spcAft>
+            <a:buNone/>
+          </a:pPr>
+          <a:r>
+            <a:rPr lang="ko-KR" altLang="en-US" sz="800" kern="1200" dirty="0"/>
+            <a:t>메인</a:t>
+          </a:r>
+        </a:p>
+      </dsp:txBody>
+      <dsp:txXfrm>
+        <a:off x="3996805" y="2247221"/>
         <a:ext cx="705212" cy="352606"/>
       </dsp:txXfrm>
     </dsp:sp>
@@ -4893,6 +5271,86 @@
       </dsp:txBody>
       <dsp:txXfrm>
         <a:off x="1865948" y="678063"/>
+        <a:ext cx="705212" cy="352606"/>
+      </dsp:txXfrm>
+    </dsp:sp>
+    <dsp:sp modelId="{987B2040-E990-6947-9A8A-0B5E70FDDC6E}">
+      <dsp:nvSpPr>
+        <dsp:cNvPr id="0" name=""/>
+        <dsp:cNvSpPr/>
+      </dsp:nvSpPr>
+      <dsp:spPr>
+        <a:xfrm>
+          <a:off x="2279943" y="1216344"/>
+          <a:ext cx="705212" cy="352606"/>
+        </a:xfrm>
+        <a:prstGeom prst="rect">
+          <a:avLst/>
+        </a:prstGeom>
+        <a:solidFill>
+          <a:schemeClr val="lt1">
+            <a:hueOff val="0"/>
+            <a:satOff val="0"/>
+            <a:lumOff val="0"/>
+            <a:alphaOff val="0"/>
+          </a:schemeClr>
+        </a:solidFill>
+        <a:ln w="12700" cap="flat" cmpd="sng" algn="ctr">
+          <a:solidFill>
+            <a:schemeClr val="dk1">
+              <a:shade val="80000"/>
+              <a:hueOff val="0"/>
+              <a:satOff val="0"/>
+              <a:lumOff val="0"/>
+              <a:alphaOff val="0"/>
+            </a:schemeClr>
+          </a:solidFill>
+          <a:prstDash val="solid"/>
+          <a:miter lim="800000"/>
+        </a:ln>
+        <a:effectLst/>
+      </dsp:spPr>
+      <dsp:style>
+        <a:lnRef idx="2">
+          <a:scrgbClr r="0" g="0" b="0"/>
+        </a:lnRef>
+        <a:fillRef idx="1">
+          <a:scrgbClr r="0" g="0" b="0"/>
+        </a:fillRef>
+        <a:effectRef idx="0">
+          <a:scrgbClr r="0" g="0" b="0"/>
+        </a:effectRef>
+        <a:fontRef idx="minor">
+          <a:schemeClr val="lt1"/>
+        </a:fontRef>
+      </dsp:style>
+      <dsp:txBody>
+        <a:bodyPr spcFirstLastPara="0" vert="horz" wrap="square" lIns="5080" tIns="5080" rIns="5080" bIns="5080" numCol="1" spcCol="1270" anchor="ctr" anchorCtr="0">
+          <a:noAutofit/>
+        </a:bodyPr>
+        <a:lstStyle/>
+        <a:p>
+          <a:pPr marL="0" lvl="0" indent="0" algn="ctr" defTabSz="355600" latinLnBrk="1">
+            <a:lnSpc>
+              <a:spcPct val="90000"/>
+            </a:lnSpc>
+            <a:spcBef>
+              <a:spcPct val="0"/>
+            </a:spcBef>
+            <a:spcAft>
+              <a:spcPct val="35000"/>
+            </a:spcAft>
+            <a:buNone/>
+          </a:pPr>
+          <a:r>
+            <a:rPr lang="en-US" altLang="ko-KR" sz="800" kern="1200" dirty="0"/>
+            <a:t>carousels</a:t>
+          </a:r>
+          <a:endParaRPr lang="ko-KR" altLang="en-US" sz="800" kern="1200" dirty="0"/>
+        </a:p>
+      </dsp:txBody>
+      <dsp:txXfrm>
+        <a:off x="2279943" y="1216344"/>
         <a:ext cx="705212" cy="352606"/>
       </dsp:txXfrm>
     </dsp:sp>
@@ -5302,7 +5760,7 @@
       </dsp:nvSpPr>
       <dsp:spPr>
         <a:xfrm>
-          <a:off x="4767306" y="1604984"/>
+          <a:off x="4775473" y="1629476"/>
           <a:ext cx="705212" cy="352606"/>
         </a:xfrm>
         <a:prstGeom prst="rect">
@@ -5371,7 +5829,7 @@
         </a:p>
       </dsp:txBody>
       <dsp:txXfrm>
-        <a:off x="4767306" y="1604984"/>
+        <a:off x="4775473" y="1629476"/>
         <a:ext cx="705212" cy="352606"/>
       </dsp:txXfrm>
     </dsp:sp>
@@ -6030,7 +6488,7 @@
       </dsp:nvSpPr>
       <dsp:spPr>
         <a:xfrm>
-          <a:off x="0" y="1015133"/>
+          <a:off x="65314" y="998804"/>
           <a:ext cx="705212" cy="352606"/>
         </a:xfrm>
         <a:prstGeom prst="rect">
@@ -6102,7 +6560,7 @@
         </a:p>
       </dsp:txBody>
       <dsp:txXfrm>
-        <a:off x="0" y="1015133"/>
+        <a:off x="65314" y="998804"/>
         <a:ext cx="705212" cy="352606"/>
       </dsp:txXfrm>
     </dsp:sp>
@@ -6196,7 +6654,7 @@
       </dsp:nvSpPr>
       <dsp:spPr>
         <a:xfrm>
-          <a:off x="774124" y="1015133"/>
+          <a:off x="987042" y="1010232"/>
           <a:ext cx="705212" cy="352606"/>
         </a:xfrm>
         <a:prstGeom prst="rect">
@@ -6259,12 +6717,20 @@
           </a:pPr>
           <a:r>
             <a:rPr lang="ko-KR" altLang="en-US" sz="800" kern="1200" dirty="0"/>
-            <a:t>수정 </a:t>
+            <a:t>수정</a:t>
+          </a:r>
+          <a:r>
+            <a:rPr lang="en-US" altLang="ko-KR" sz="800" kern="1200" dirty="0"/>
+            <a:t>/</a:t>
+          </a:r>
+          <a:r>
+            <a:rPr lang="ko-KR" altLang="en-US" sz="800" kern="1200" dirty="0"/>
+            <a:t>삭제 </a:t>
           </a:r>
         </a:p>
       </dsp:txBody>
       <dsp:txXfrm>
-        <a:off x="774124" y="1015133"/>
+        <a:off x="987042" y="1010232"/>
         <a:ext cx="705212" cy="352606"/>
       </dsp:txXfrm>
     </dsp:sp>
@@ -6275,7 +6741,7 @@
       </dsp:nvSpPr>
       <dsp:spPr>
         <a:xfrm>
-          <a:off x="4143193" y="233839"/>
+          <a:off x="4143193" y="250168"/>
           <a:ext cx="705212" cy="352606"/>
         </a:xfrm>
         <a:prstGeom prst="rect">
@@ -6343,7 +6809,7 @@
         </a:p>
       </dsp:txBody>
       <dsp:txXfrm>
-        <a:off x="4143193" y="233839"/>
+        <a:off x="4143193" y="250168"/>
         <a:ext cx="705212" cy="352606"/>
       </dsp:txXfrm>
     </dsp:sp>
@@ -8662,7 +9128,7 @@
           <a:p>
             <a:fld id="{CE0542E4-A0D5-0545-BE4B-D17D32169AEE}" type="datetimeFigureOut">
               <a:rPr kumimoji="1" lang="ko-Kore-KR" altLang="en-US" smtClean="0"/>
-              <a:t>2021. 11. 16.</a:t>
+              <a:t>2021. 11. 17.</a:t>
             </a:fld>
             <a:endParaRPr kumimoji="1" lang="ko-Kore-KR" altLang="en-US"/>
           </a:p>
@@ -8832,7 +9298,7 @@
           <a:p>
             <a:fld id="{CE0542E4-A0D5-0545-BE4B-D17D32169AEE}" type="datetimeFigureOut">
               <a:rPr kumimoji="1" lang="ko-Kore-KR" altLang="en-US" smtClean="0"/>
-              <a:t>2021. 11. 16.</a:t>
+              <a:t>2021. 11. 17.</a:t>
             </a:fld>
             <a:endParaRPr kumimoji="1" lang="ko-Kore-KR" altLang="en-US"/>
           </a:p>
@@ -9012,7 +9478,7 @@
           <a:p>
             <a:fld id="{CE0542E4-A0D5-0545-BE4B-D17D32169AEE}" type="datetimeFigureOut">
               <a:rPr kumimoji="1" lang="ko-Kore-KR" altLang="en-US" smtClean="0"/>
-              <a:t>2021. 11. 16.</a:t>
+              <a:t>2021. 11. 17.</a:t>
             </a:fld>
             <a:endParaRPr kumimoji="1" lang="ko-Kore-KR" altLang="en-US"/>
           </a:p>
@@ -9182,7 +9648,7 @@
           <a:p>
             <a:fld id="{CE0542E4-A0D5-0545-BE4B-D17D32169AEE}" type="datetimeFigureOut">
               <a:rPr kumimoji="1" lang="ko-Kore-KR" altLang="en-US" smtClean="0"/>
-              <a:t>2021. 11. 16.</a:t>
+              <a:t>2021. 11. 17.</a:t>
             </a:fld>
             <a:endParaRPr kumimoji="1" lang="ko-Kore-KR" altLang="en-US"/>
           </a:p>
@@ -9428,7 +9894,7 @@
           <a:p>
             <a:fld id="{CE0542E4-A0D5-0545-BE4B-D17D32169AEE}" type="datetimeFigureOut">
               <a:rPr kumimoji="1" lang="ko-Kore-KR" altLang="en-US" smtClean="0"/>
-              <a:t>2021. 11. 16.</a:t>
+              <a:t>2021. 11. 17.</a:t>
             </a:fld>
             <a:endParaRPr kumimoji="1" lang="ko-Kore-KR" altLang="en-US"/>
           </a:p>
@@ -9660,7 +10126,7 @@
           <a:p>
             <a:fld id="{CE0542E4-A0D5-0545-BE4B-D17D32169AEE}" type="datetimeFigureOut">
               <a:rPr kumimoji="1" lang="ko-Kore-KR" altLang="en-US" smtClean="0"/>
-              <a:t>2021. 11. 16.</a:t>
+              <a:t>2021. 11. 17.</a:t>
             </a:fld>
             <a:endParaRPr kumimoji="1" lang="ko-Kore-KR" altLang="en-US"/>
           </a:p>
@@ -10027,7 +10493,7 @@
           <a:p>
             <a:fld id="{CE0542E4-A0D5-0545-BE4B-D17D32169AEE}" type="datetimeFigureOut">
               <a:rPr kumimoji="1" lang="ko-Kore-KR" altLang="en-US" smtClean="0"/>
-              <a:t>2021. 11. 16.</a:t>
+              <a:t>2021. 11. 17.</a:t>
             </a:fld>
             <a:endParaRPr kumimoji="1" lang="ko-Kore-KR" altLang="en-US"/>
           </a:p>
@@ -10145,7 +10611,7 @@
           <a:p>
             <a:fld id="{CE0542E4-A0D5-0545-BE4B-D17D32169AEE}" type="datetimeFigureOut">
               <a:rPr kumimoji="1" lang="ko-Kore-KR" altLang="en-US" smtClean="0"/>
-              <a:t>2021. 11. 16.</a:t>
+              <a:t>2021. 11. 17.</a:t>
             </a:fld>
             <a:endParaRPr kumimoji="1" lang="ko-Kore-KR" altLang="en-US"/>
           </a:p>
@@ -10240,7 +10706,7 @@
           <a:p>
             <a:fld id="{CE0542E4-A0D5-0545-BE4B-D17D32169AEE}" type="datetimeFigureOut">
               <a:rPr kumimoji="1" lang="ko-Kore-KR" altLang="en-US" smtClean="0"/>
-              <a:t>2021. 11. 16.</a:t>
+              <a:t>2021. 11. 17.</a:t>
             </a:fld>
             <a:endParaRPr kumimoji="1" lang="ko-Kore-KR" altLang="en-US"/>
           </a:p>
@@ -10517,7 +10983,7 @@
           <a:p>
             <a:fld id="{CE0542E4-A0D5-0545-BE4B-D17D32169AEE}" type="datetimeFigureOut">
               <a:rPr kumimoji="1" lang="ko-Kore-KR" altLang="en-US" smtClean="0"/>
-              <a:t>2021. 11. 16.</a:t>
+              <a:t>2021. 11. 17.</a:t>
             </a:fld>
             <a:endParaRPr kumimoji="1" lang="ko-Kore-KR" altLang="en-US"/>
           </a:p>
@@ -10774,7 +11240,7 @@
           <a:p>
             <a:fld id="{CE0542E4-A0D5-0545-BE4B-D17D32169AEE}" type="datetimeFigureOut">
               <a:rPr kumimoji="1" lang="ko-Kore-KR" altLang="en-US" smtClean="0"/>
-              <a:t>2021. 11. 16.</a:t>
+              <a:t>2021. 11. 17.</a:t>
             </a:fld>
             <a:endParaRPr kumimoji="1" lang="ko-Kore-KR" altLang="en-US"/>
           </a:p>
@@ -10987,7 +11453,7 @@
           <a:p>
             <a:fld id="{CE0542E4-A0D5-0545-BE4B-D17D32169AEE}" type="datetimeFigureOut">
               <a:rPr kumimoji="1" lang="ko-Kore-KR" altLang="en-US" smtClean="0"/>
-              <a:t>2021. 11. 16.</a:t>
+              <a:t>2021. 11. 17.</a:t>
             </a:fld>
             <a:endParaRPr kumimoji="1" lang="ko-Kore-KR" altLang="en-US"/>
           </a:p>
@@ -11405,13 +11871,13 @@
           <p:nvPr>
             <p:extLst>
               <p:ext uri="{D42A27DB-BD31-4B8C-83A1-F6EECF244321}">
-                <p14:modId xmlns:p14="http://schemas.microsoft.com/office/powerpoint/2010/main" val="674946383"/>
+                <p14:modId xmlns:p14="http://schemas.microsoft.com/office/powerpoint/2010/main" val="694276675"/>
               </p:ext>
             </p:extLst>
           </p:nvPr>
         </p:nvGraphicFramePr>
         <p:xfrm>
-          <a:off x="76200" y="350258"/>
+          <a:off x="76200" y="249674"/>
           <a:ext cx="8991600" cy="8369171"/>
         </p:xfrm>
         <a:graphic>

</xml_diff>